<commit_message>
Thêm SUSE 15 cho thay dổi PE size
</commit_message>
<xml_diff>
--- a/Ansible_LVM.pptx
+++ b/Ansible_LVM.pptx
@@ -5,10 +5,10 @@
     <p:sldMasterId id="2147483660" r:id="rId4"/>
   </p:sldMasterIdLst>
   <p:notesMasterIdLst>
-    <p:notesMasterId r:id="rId49"/>
+    <p:notesMasterId r:id="rId50"/>
   </p:notesMasterIdLst>
   <p:handoutMasterIdLst>
-    <p:handoutMasterId r:id="rId50"/>
+    <p:handoutMasterId r:id="rId51"/>
   </p:handoutMasterIdLst>
   <p:sldIdLst>
     <p:sldId id="332" r:id="rId5"/>
@@ -53,8 +53,9 @@
     <p:sldId id="471" r:id="rId44"/>
     <p:sldId id="472" r:id="rId45"/>
     <p:sldId id="473" r:id="rId46"/>
-    <p:sldId id="479" r:id="rId47"/>
-    <p:sldId id="475" r:id="rId48"/>
+    <p:sldId id="484" r:id="rId47"/>
+    <p:sldId id="479" r:id="rId48"/>
+    <p:sldId id="475" r:id="rId49"/>
   </p:sldIdLst>
   <p:sldSz cx="12192000" cy="6858000"/>
   <p:notesSz cx="6858000" cy="9144000"/>
@@ -263,7 +264,7 @@
           <a:p>
             <a:fld id="{80680FBE-A8DF-4758-9AC4-3A9E1039168F}" type="datetimeFigureOut">
               <a:rPr lang="en-US" smtClean="0"/>
-              <a:t>7/16/2021</a:t>
+              <a:t>8/13/2021</a:t>
             </a:fld>
             <a:endParaRPr lang="en-US"/>
           </a:p>
@@ -428,7 +429,7 @@
           <a:p>
             <a:fld id="{EC13577B-6902-467D-A26C-08A0DD5E4E03}" type="datetimeFigureOut">
               <a:rPr lang="en-US" smtClean="0"/>
-              <a:t>7/16/2021</a:t>
+              <a:t>8/13/2021</a:t>
             </a:fld>
             <a:endParaRPr lang="en-US"/>
           </a:p>
@@ -7935,12 +7936,7 @@
             <p:ph type="sldImg"/>
           </p:nvPr>
         </p:nvSpPr>
-        <p:spPr>
-          <a:xfrm>
-            <a:off x="685800" y="1143000"/>
-            <a:ext cx="5486400" cy="3086100"/>
-          </a:xfrm>
-        </p:spPr>
+        <p:spPr/>
       </p:sp>
       <p:sp>
         <p:nvSpPr>
@@ -7957,7 +7953,30 @@
           <a:bodyPr/>
           <a:lstStyle/>
           <a:p>
-            <a:endParaRPr lang="en-US"/>
+            <a:pPr marL="0" marR="0" indent="0" algn="l" defTabSz="914400" rtl="0" eaLnBrk="1" fontAlgn="auto" latinLnBrk="0" hangingPunct="1">
+              <a:lnSpc>
+                <a:spcPct val="100000"/>
+              </a:lnSpc>
+              <a:spcBef>
+                <a:spcPts val="0"/>
+              </a:spcBef>
+              <a:spcAft>
+                <a:spcPts val="0"/>
+              </a:spcAft>
+              <a:buClrTx/>
+              <a:buSzTx/>
+              <a:buFontTx/>
+              <a:buNone/>
+              <a:tabLst/>
+              <a:defRPr/>
+            </a:pPr>
+            <a:endParaRPr lang="en-US" b="0" smtClean="0">
+              <a:solidFill>
+                <a:schemeClr val="tx1"/>
+              </a:solidFill>
+              <a:latin typeface="Times New Roman" panose="02020603050405020304" pitchFamily="18" charset="0"/>
+              <a:cs typeface="Times New Roman" panose="02020603050405020304" pitchFamily="18" charset="0"/>
+            </a:endParaRPr>
           </a:p>
         </p:txBody>
       </p:sp>
@@ -7987,7 +8006,7 @@
     </p:spTree>
     <p:extLst>
       <p:ext uri="{BB962C8B-B14F-4D97-AF65-F5344CB8AC3E}">
-        <p14:creationId xmlns:p14="http://schemas.microsoft.com/office/powerpoint/2010/main" val="117243963"/>
+        <p14:creationId xmlns:p14="http://schemas.microsoft.com/office/powerpoint/2010/main" val="228107230"/>
       </p:ext>
     </p:extLst>
   </p:cSld>
@@ -8068,6 +8087,95 @@
             <a:fld id="{DF61EA0F-A667-4B49-8422-0062BC55E249}" type="slidenum">
               <a:rPr lang="en-US" smtClean="0"/>
               <a:t>44</a:t>
+            </a:fld>
+            <a:endParaRPr lang="en-US"/>
+          </a:p>
+        </p:txBody>
+      </p:sp>
+    </p:spTree>
+    <p:extLst>
+      <p:ext uri="{BB962C8B-B14F-4D97-AF65-F5344CB8AC3E}">
+        <p14:creationId xmlns:p14="http://schemas.microsoft.com/office/powerpoint/2010/main" val="117243963"/>
+      </p:ext>
+    </p:extLst>
+  </p:cSld>
+  <p:clrMapOvr>
+    <a:masterClrMapping/>
+  </p:clrMapOvr>
+</p:notes>
+</file>
+
+<file path=ppt/notesSlides/notesSlide45.xml><?xml version="1.0" encoding="utf-8"?>
+<p:notes xmlns:a="http://schemas.openxmlformats.org/drawingml/2006/main" xmlns:r="http://schemas.openxmlformats.org/officeDocument/2006/relationships" xmlns:p="http://schemas.openxmlformats.org/presentationml/2006/main">
+  <p:cSld>
+    <p:spTree>
+      <p:nvGrpSpPr>
+        <p:cNvPr id="1" name=""/>
+        <p:cNvGrpSpPr/>
+        <p:nvPr/>
+      </p:nvGrpSpPr>
+      <p:grpSpPr>
+        <a:xfrm>
+          <a:off x="0" y="0"/>
+          <a:ext cx="0" cy="0"/>
+          <a:chOff x="0" y="0"/>
+          <a:chExt cx="0" cy="0"/>
+        </a:xfrm>
+      </p:grpSpPr>
+      <p:sp>
+        <p:nvSpPr>
+          <p:cNvPr id="2" name="Slide Image Placeholder 1"/>
+          <p:cNvSpPr>
+            <a:spLocks noGrp="1" noRot="1" noChangeAspect="1"/>
+          </p:cNvSpPr>
+          <p:nvPr>
+            <p:ph type="sldImg"/>
+          </p:nvPr>
+        </p:nvSpPr>
+        <p:spPr>
+          <a:xfrm>
+            <a:off x="685800" y="1143000"/>
+            <a:ext cx="5486400" cy="3086100"/>
+          </a:xfrm>
+        </p:spPr>
+      </p:sp>
+      <p:sp>
+        <p:nvSpPr>
+          <p:cNvPr id="3" name="Notes Placeholder 2"/>
+          <p:cNvSpPr>
+            <a:spLocks noGrp="1"/>
+          </p:cNvSpPr>
+          <p:nvPr>
+            <p:ph type="body" idx="1"/>
+          </p:nvPr>
+        </p:nvSpPr>
+        <p:spPr/>
+        <p:txBody>
+          <a:bodyPr/>
+          <a:lstStyle/>
+          <a:p>
+            <a:endParaRPr lang="en-US"/>
+          </a:p>
+        </p:txBody>
+      </p:sp>
+      <p:sp>
+        <p:nvSpPr>
+          <p:cNvPr id="4" name="Slide Number Placeholder 3"/>
+          <p:cNvSpPr>
+            <a:spLocks noGrp="1"/>
+          </p:cNvSpPr>
+          <p:nvPr>
+            <p:ph type="sldNum" sz="quarter" idx="10"/>
+          </p:nvPr>
+        </p:nvSpPr>
+        <p:spPr/>
+        <p:txBody>
+          <a:bodyPr/>
+          <a:lstStyle/>
+          <a:p>
+            <a:fld id="{DF61EA0F-A667-4B49-8422-0062BC55E249}" type="slidenum">
+              <a:rPr lang="en-US" smtClean="0"/>
+              <a:t>45</a:t>
             </a:fld>
             <a:endParaRPr lang="en-US"/>
           </a:p>
@@ -10654,7 +10762,7 @@
           <a:p>
             <a:fld id="{88AB3105-DC0B-46AA-BF7C-10324D269079}" type="datetime1">
               <a:rPr lang="en-US" smtClean="0"/>
-              <a:t>7/16/2021</a:t>
+              <a:t>8/13/2021</a:t>
             </a:fld>
             <a:endParaRPr lang="en-US"/>
           </a:p>
@@ -11279,7 +11387,7 @@
           <a:p>
             <a:fld id="{2521DD47-529A-4D68-B2F5-5A02D688CB19}" type="datetime1">
               <a:rPr lang="en-US" smtClean="0"/>
-              <a:t>7/16/2021</a:t>
+              <a:t>8/13/2021</a:t>
             </a:fld>
             <a:endParaRPr lang="en-US"/>
           </a:p>
@@ -11836,6 +11944,37 @@
               </a:rPr>
             </a:br>
             <a:r>
+              <a:rPr lang="en-US" sz="3000" smtClean="0">
+                <a:solidFill>
+                  <a:schemeClr val="bg1"/>
+                </a:solidFill>
+              </a:rPr>
+              <a:t>Thay đổi mới </a:t>
+            </a:r>
+            <a:r>
+              <a:rPr lang="en-US" sz="3000" smtClean="0">
+                <a:solidFill>
+                  <a:schemeClr val="bg1"/>
+                </a:solidFill>
+              </a:rPr>
+              <a:t>nhất: 13/08/2021</a:t>
+            </a:r>
+            <a:r>
+              <a:rPr lang="en-US" sz="4000" smtClean="0">
+                <a:solidFill>
+                  <a:schemeClr val="bg1"/>
+                </a:solidFill>
+              </a:rPr>
+              <a:t/>
+            </a:r>
+            <a:br>
+              <a:rPr lang="en-US" sz="4000" smtClean="0">
+                <a:solidFill>
+                  <a:schemeClr val="bg1"/>
+                </a:solidFill>
+              </a:rPr>
+            </a:br>
+            <a:r>
               <a:rPr lang="en-US" sz="4000" smtClean="0">
                 <a:solidFill>
                   <a:schemeClr val="bg1"/>
@@ -29159,7 +29298,7 @@
                   <a:srgbClr val="FF00FF"/>
                 </a:solidFill>
               </a:rPr>
-              <a:t>PE</a:t>
+              <a:t>PE size</a:t>
             </a:r>
             <a:r>
               <a:rPr lang="en-US" sz="2500" b="1">
@@ -29469,6 +29608,451 @@
       </p:grpSpPr>
       <p:sp>
         <p:nvSpPr>
+          <p:cNvPr id="6" name="Title 7"/>
+          <p:cNvSpPr txBox="1">
+            <a:spLocks/>
+          </p:cNvSpPr>
+          <p:nvPr/>
+        </p:nvSpPr>
+        <p:spPr>
+          <a:xfrm>
+            <a:off x="521207" y="1348353"/>
+            <a:ext cx="11133518" cy="5303170"/>
+          </a:xfrm>
+          <a:prstGeom prst="rect">
+            <a:avLst/>
+          </a:prstGeom>
+        </p:spPr>
+        <p:txBody>
+          <a:bodyPr vert="horz" lIns="91440" tIns="45720" rIns="91440" bIns="45720" rtlCol="0" anchor="b" anchorCtr="0">
+            <a:noAutofit/>
+          </a:bodyPr>
+          <a:lstStyle>
+            <a:lvl1pPr algn="l" defTabSz="914400" rtl="0" eaLnBrk="1" latinLnBrk="0" hangingPunct="1">
+              <a:spcBef>
+                <a:spcPct val="0"/>
+              </a:spcBef>
+              <a:buNone/>
+              <a:defRPr sz="2800" kern="1200">
+                <a:solidFill>
+                  <a:schemeClr val="bg2">
+                    <a:lumMod val="25000"/>
+                  </a:schemeClr>
+                </a:solidFill>
+                <a:latin typeface="+mj-lt"/>
+                <a:ea typeface="+mj-ea"/>
+                <a:cs typeface="+mj-cs"/>
+              </a:defRPr>
+            </a:lvl1pPr>
+          </a:lstStyle>
+          <a:p>
+            <a:endParaRPr lang="en-US" b="1" smtClean="0">
+              <a:solidFill>
+                <a:srgbClr val="00B0F0"/>
+              </a:solidFill>
+              <a:latin typeface="Segoe UI Light" panose="020B0502040204020203" pitchFamily="34" charset="0"/>
+              <a:cs typeface="Segoe UI Light" panose="020B0502040204020203" pitchFamily="34" charset="0"/>
+            </a:endParaRPr>
+          </a:p>
+          <a:p>
+            <a:endParaRPr lang="en-US" b="1">
+              <a:solidFill>
+                <a:srgbClr val="00B0F0"/>
+              </a:solidFill>
+              <a:latin typeface="Segoe UI Light" panose="020B0502040204020203" pitchFamily="34" charset="0"/>
+              <a:cs typeface="Segoe UI Light" panose="020B0502040204020203" pitchFamily="34" charset="0"/>
+            </a:endParaRPr>
+          </a:p>
+          <a:p>
+            <a:endParaRPr lang="en-US" b="1" smtClean="0">
+              <a:solidFill>
+                <a:srgbClr val="00B0F0"/>
+              </a:solidFill>
+              <a:latin typeface="Segoe UI Light" panose="020B0502040204020203" pitchFamily="34" charset="0"/>
+              <a:cs typeface="Segoe UI Light" panose="020B0502040204020203" pitchFamily="34" charset="0"/>
+            </a:endParaRPr>
+          </a:p>
+          <a:p>
+            <a:endParaRPr lang="en-US" b="1">
+              <a:solidFill>
+                <a:srgbClr val="00B0F0"/>
+              </a:solidFill>
+              <a:latin typeface="Segoe UI Light" panose="020B0502040204020203" pitchFamily="34" charset="0"/>
+              <a:cs typeface="Segoe UI Light" panose="020B0502040204020203" pitchFamily="34" charset="0"/>
+            </a:endParaRPr>
+          </a:p>
+          <a:p>
+            <a:endParaRPr lang="en-US" b="1" smtClean="0">
+              <a:solidFill>
+                <a:srgbClr val="00B0F0"/>
+              </a:solidFill>
+              <a:latin typeface="Segoe UI Light" panose="020B0502040204020203" pitchFamily="34" charset="0"/>
+              <a:cs typeface="Segoe UI Light" panose="020B0502040204020203" pitchFamily="34" charset="0"/>
+            </a:endParaRPr>
+          </a:p>
+          <a:p>
+            <a:endParaRPr lang="en-US" b="1">
+              <a:solidFill>
+                <a:srgbClr val="00B0F0"/>
+              </a:solidFill>
+              <a:latin typeface="Segoe UI Light" panose="020B0502040204020203" pitchFamily="34" charset="0"/>
+              <a:cs typeface="Segoe UI Light" panose="020B0502040204020203" pitchFamily="34" charset="0"/>
+            </a:endParaRPr>
+          </a:p>
+          <a:p>
+            <a:endParaRPr lang="en-US" b="1" smtClean="0">
+              <a:solidFill>
+                <a:srgbClr val="00B0F0"/>
+              </a:solidFill>
+              <a:latin typeface="Segoe UI Light" panose="020B0502040204020203" pitchFamily="34" charset="0"/>
+              <a:cs typeface="Segoe UI Light" panose="020B0502040204020203" pitchFamily="34" charset="0"/>
+            </a:endParaRPr>
+          </a:p>
+          <a:p>
+            <a:endParaRPr lang="en-US" b="1" smtClean="0">
+              <a:solidFill>
+                <a:srgbClr val="00B0F0"/>
+              </a:solidFill>
+              <a:latin typeface="Segoe UI Light" panose="020B0502040204020203" pitchFamily="34" charset="0"/>
+              <a:cs typeface="Segoe UI Light" panose="020B0502040204020203" pitchFamily="34" charset="0"/>
+            </a:endParaRPr>
+          </a:p>
+          <a:p>
+            <a:endParaRPr lang="en-US" sz="2400" b="1" smtClean="0">
+              <a:solidFill>
+                <a:srgbClr val="00B0F0"/>
+              </a:solidFill>
+              <a:latin typeface="Segoe UI Light" panose="020B0502040204020203" pitchFamily="34" charset="0"/>
+              <a:cs typeface="Segoe UI Light" panose="020B0502040204020203" pitchFamily="34" charset="0"/>
+            </a:endParaRPr>
+          </a:p>
+        </p:txBody>
+      </p:sp>
+      <p:sp>
+        <p:nvSpPr>
+          <p:cNvPr id="2" name="Title 1"/>
+          <p:cNvSpPr>
+            <a:spLocks noGrp="1"/>
+          </p:cNvSpPr>
+          <p:nvPr>
+            <p:ph type="title"/>
+          </p:nvPr>
+        </p:nvSpPr>
+        <p:spPr>
+          <a:xfrm>
+            <a:off x="521206" y="448055"/>
+            <a:ext cx="11133519" cy="463987"/>
+          </a:xfrm>
+        </p:spPr>
+        <p:txBody>
+          <a:bodyPr>
+            <a:noAutofit/>
+          </a:bodyPr>
+          <a:lstStyle/>
+          <a:p>
+            <a:r>
+              <a:rPr lang="en-US" sz="2500" b="1">
+                <a:solidFill>
+                  <a:srgbClr val="FF00FF"/>
+                </a:solidFill>
+              </a:rPr>
+              <a:t>6</a:t>
+            </a:r>
+            <a:r>
+              <a:rPr lang="en-US" sz="2500" b="1" smtClean="0">
+                <a:solidFill>
+                  <a:srgbClr val="FF00FF"/>
+                </a:solidFill>
+              </a:rPr>
+              <a:t>. SUSE 15</a:t>
+            </a:r>
+            <a:r>
+              <a:rPr lang="en-US" sz="2500" b="1" smtClean="0">
+                <a:solidFill>
+                  <a:srgbClr val="00B050"/>
+                </a:solidFill>
+              </a:rPr>
+              <a:t> cũng cho thay đổi </a:t>
+            </a:r>
+            <a:r>
+              <a:rPr lang="en-US" sz="2500" b="1" smtClean="0">
+                <a:solidFill>
+                  <a:srgbClr val="FF00FF"/>
+                </a:solidFill>
+              </a:rPr>
+              <a:t>PE size</a:t>
+            </a:r>
+            <a:endParaRPr lang="en-US" sz="2500" b="1">
+              <a:solidFill>
+                <a:srgbClr val="FF00FF"/>
+              </a:solidFill>
+            </a:endParaRPr>
+          </a:p>
+        </p:txBody>
+      </p:sp>
+      <p:sp>
+        <p:nvSpPr>
+          <p:cNvPr id="5" name="Title 1"/>
+          <p:cNvSpPr txBox="1">
+            <a:spLocks/>
+          </p:cNvSpPr>
+          <p:nvPr/>
+        </p:nvSpPr>
+        <p:spPr>
+          <a:xfrm>
+            <a:off x="521207" y="1301857"/>
+            <a:ext cx="11133518" cy="5176436"/>
+          </a:xfrm>
+          <a:prstGeom prst="rect">
+            <a:avLst/>
+          </a:prstGeom>
+        </p:spPr>
+        <p:txBody>
+          <a:bodyPr vert="horz" lIns="91440" tIns="45720" rIns="91440" bIns="45720" rtlCol="0" anchor="b" anchorCtr="0">
+            <a:normAutofit/>
+          </a:bodyPr>
+          <a:lstStyle>
+            <a:lvl1pPr algn="l" defTabSz="914400" rtl="0" eaLnBrk="1" latinLnBrk="0" hangingPunct="1">
+              <a:spcBef>
+                <a:spcPct val="0"/>
+              </a:spcBef>
+              <a:buNone/>
+              <a:defRPr sz="2800" kern="1200">
+                <a:solidFill>
+                  <a:schemeClr val="bg2">
+                    <a:lumMod val="25000"/>
+                  </a:schemeClr>
+                </a:solidFill>
+                <a:latin typeface="+mj-lt"/>
+                <a:ea typeface="+mj-ea"/>
+                <a:cs typeface="+mj-cs"/>
+              </a:defRPr>
+            </a:lvl1pPr>
+          </a:lstStyle>
+          <a:p>
+            <a:endParaRPr lang="en-US" b="1" smtClean="0">
+              <a:solidFill>
+                <a:srgbClr val="FF0000"/>
+              </a:solidFill>
+            </a:endParaRPr>
+          </a:p>
+        </p:txBody>
+      </p:sp>
+      <p:sp>
+        <p:nvSpPr>
+          <p:cNvPr id="4" name="Slide Number Placeholder 3"/>
+          <p:cNvSpPr>
+            <a:spLocks noGrp="1"/>
+          </p:cNvSpPr>
+          <p:nvPr>
+            <p:ph type="sldNum" sz="quarter" idx="4"/>
+          </p:nvPr>
+        </p:nvSpPr>
+        <p:spPr/>
+        <p:txBody>
+          <a:bodyPr/>
+          <a:lstStyle/>
+          <a:p>
+            <a:fld id="{9860EDB8-5305-433F-BE41-D7A86D811DB3}" type="slidenum">
+              <a:rPr lang="en-US" smtClean="0"/>
+              <a:pPr/>
+              <a:t>43</a:t>
+            </a:fld>
+            <a:endParaRPr lang="en-US"/>
+          </a:p>
+        </p:txBody>
+      </p:sp>
+      <p:pic>
+        <p:nvPicPr>
+          <p:cNvPr id="9" name="Picture 8"/>
+          <p:cNvPicPr>
+            <a:picLocks noChangeAspect="1"/>
+          </p:cNvPicPr>
+          <p:nvPr/>
+        </p:nvPicPr>
+        <p:blipFill>
+          <a:blip r:embed="rId3">
+            <a:extLst>
+              <a:ext uri="{28A0092B-C50C-407E-A947-70E740481C1C}">
+                <a14:useLocalDpi xmlns:a14="http://schemas.microsoft.com/office/drawing/2010/main" val="0"/>
+              </a:ext>
+            </a:extLst>
+          </a:blip>
+          <a:stretch>
+            <a:fillRect/>
+          </a:stretch>
+        </p:blipFill>
+        <p:spPr>
+          <a:xfrm>
+            <a:off x="3054590" y="925577"/>
+            <a:ext cx="7783284" cy="5800658"/>
+          </a:xfrm>
+          <a:prstGeom prst="rect">
+            <a:avLst/>
+          </a:prstGeom>
+        </p:spPr>
+      </p:pic>
+      <p:pic>
+        <p:nvPicPr>
+          <p:cNvPr id="10" name="Picture 9"/>
+          <p:cNvPicPr>
+            <a:picLocks noChangeAspect="1"/>
+          </p:cNvPicPr>
+          <p:nvPr/>
+        </p:nvPicPr>
+        <p:blipFill>
+          <a:blip r:embed="rId4">
+            <a:extLst>
+              <a:ext uri="{28A0092B-C50C-407E-A947-70E740481C1C}">
+                <a14:useLocalDpi xmlns:a14="http://schemas.microsoft.com/office/drawing/2010/main" val="0"/>
+              </a:ext>
+            </a:extLst>
+          </a:blip>
+          <a:stretch>
+            <a:fillRect/>
+          </a:stretch>
+        </p:blipFill>
+        <p:spPr>
+          <a:xfrm>
+            <a:off x="1216354" y="2799620"/>
+            <a:ext cx="905001" cy="1200318"/>
+          </a:xfrm>
+          <a:prstGeom prst="rect">
+            <a:avLst/>
+          </a:prstGeom>
+        </p:spPr>
+      </p:pic>
+      <p:sp>
+        <p:nvSpPr>
+          <p:cNvPr id="12" name="Rectangle 11"/>
+          <p:cNvSpPr/>
+          <p:nvPr/>
+        </p:nvSpPr>
+        <p:spPr>
+          <a:xfrm>
+            <a:off x="3141552" y="2771321"/>
+            <a:ext cx="977774" cy="550340"/>
+          </a:xfrm>
+          <a:prstGeom prst="rect">
+            <a:avLst/>
+          </a:prstGeom>
+          <a:noFill/>
+          <a:ln w="28575">
+            <a:solidFill>
+              <a:srgbClr val="FF00FF"/>
+            </a:solidFill>
+          </a:ln>
+        </p:spPr>
+        <p:style>
+          <a:lnRef idx="2">
+            <a:schemeClr val="accent1">
+              <a:shade val="50000"/>
+            </a:schemeClr>
+          </a:lnRef>
+          <a:fillRef idx="1">
+            <a:schemeClr val="accent1"/>
+          </a:fillRef>
+          <a:effectRef idx="0">
+            <a:schemeClr val="accent1"/>
+          </a:effectRef>
+          <a:fontRef idx="minor">
+            <a:schemeClr val="lt1"/>
+          </a:fontRef>
+        </p:style>
+        <p:txBody>
+          <a:bodyPr rtlCol="0" anchor="ctr"/>
+          <a:lstStyle/>
+          <a:p>
+            <a:pPr algn="ctr"/>
+            <a:endParaRPr lang="en-US"/>
+          </a:p>
+        </p:txBody>
+      </p:sp>
+      <p:cxnSp>
+        <p:nvCxnSpPr>
+          <p:cNvPr id="14" name="Straight Arrow Connector 13"/>
+          <p:cNvCxnSpPr>
+            <a:stCxn id="12" idx="1"/>
+          </p:cNvCxnSpPr>
+          <p:nvPr/>
+        </p:nvCxnSpPr>
+        <p:spPr>
+          <a:xfrm flipH="1">
+            <a:off x="2121355" y="3046491"/>
+            <a:ext cx="1020197" cy="76955"/>
+          </a:xfrm>
+          <a:prstGeom prst="straightConnector1">
+            <a:avLst/>
+          </a:prstGeom>
+          <a:ln w="28575">
+            <a:solidFill>
+              <a:srgbClr val="FF00FF"/>
+            </a:solidFill>
+            <a:tailEnd type="triangle"/>
+          </a:ln>
+        </p:spPr>
+        <p:style>
+          <a:lnRef idx="1">
+            <a:schemeClr val="accent1"/>
+          </a:lnRef>
+          <a:fillRef idx="0">
+            <a:schemeClr val="accent1"/>
+          </a:fillRef>
+          <a:effectRef idx="0">
+            <a:schemeClr val="accent1"/>
+          </a:effectRef>
+          <a:fontRef idx="minor">
+            <a:schemeClr val="tx1"/>
+          </a:fontRef>
+        </p:style>
+      </p:cxnSp>
+    </p:spTree>
+    <p:extLst>
+      <p:ext uri="{BB962C8B-B14F-4D97-AF65-F5344CB8AC3E}">
+        <p14:creationId xmlns:p14="http://schemas.microsoft.com/office/powerpoint/2010/main" val="2007380197"/>
+      </p:ext>
+    </p:extLst>
+  </p:cSld>
+  <p:clrMapOvr>
+    <a:masterClrMapping/>
+  </p:clrMapOvr>
+  <mc:AlternateContent xmlns:mc="http://schemas.openxmlformats.org/markup-compatibility/2006" xmlns:p14="http://schemas.microsoft.com/office/powerpoint/2010/main">
+    <mc:Choice Requires="p14">
+      <p:transition p14:dur="10"/>
+    </mc:Choice>
+    <mc:Fallback xmlns="">
+      <p:transition/>
+    </mc:Fallback>
+  </mc:AlternateContent>
+  <p:timing>
+    <p:tnLst>
+      <p:par>
+        <p:cTn id="1" dur="indefinite" restart="never" nodeType="tmRoot"/>
+      </p:par>
+    </p:tnLst>
+  </p:timing>
+</p:sld>
+</file>
+
+<file path=ppt/slides/slide44.xml><?xml version="1.0" encoding="utf-8"?>
+<p:sld xmlns:a="http://schemas.openxmlformats.org/drawingml/2006/main" xmlns:r="http://schemas.openxmlformats.org/officeDocument/2006/relationships" xmlns:p="http://schemas.openxmlformats.org/presentationml/2006/main">
+  <p:cSld>
+    <p:spTree>
+      <p:nvGrpSpPr>
+        <p:cNvPr id="1" name=""/>
+        <p:cNvGrpSpPr/>
+        <p:nvPr/>
+      </p:nvGrpSpPr>
+      <p:grpSpPr>
+        <a:xfrm>
+          <a:off x="0" y="0"/>
+          <a:ext cx="0" cy="0"/>
+          <a:chOff x="0" y="0"/>
+          <a:chExt cx="0" cy="0"/>
+        </a:xfrm>
+      </p:grpSpPr>
+      <p:sp>
+        <p:nvSpPr>
           <p:cNvPr id="2" name="Title 1"/>
           <p:cNvSpPr>
             <a:spLocks noGrp="1"/>
@@ -29709,7 +30293,7 @@
 </p:sld>
 </file>
 
-<file path=ppt/slides/slide44.xml><?xml version="1.0" encoding="utf-8"?>
+<file path=ppt/slides/slide45.xml><?xml version="1.0" encoding="utf-8"?>
 <p:sld xmlns:a="http://schemas.openxmlformats.org/drawingml/2006/main" xmlns:r="http://schemas.openxmlformats.org/officeDocument/2006/relationships" xmlns:p="http://schemas.openxmlformats.org/presentationml/2006/main">
   <p:cSld>
     <p:spTree>
@@ -31278,7 +31862,7 @@
           <a:graphicData uri="http://schemas.openxmlformats.org/presentationml/2006/ole">
             <mc:AlternateContent xmlns:mc="http://schemas.openxmlformats.org/markup-compatibility/2006">
               <mc:Choice xmlns:v="urn:schemas-microsoft-com:vml" Requires="v">
-                <p:oleObj spid="_x0000_s10522" name="Bitmap Image" r:id="rId4" imgW="8534520" imgH="4819680" progId="Paint.Picture">
+                <p:oleObj spid="_x0000_s10536" name="Bitmap Image" r:id="rId4" imgW="8534520" imgH="4819680" progId="Paint.Picture">
                   <p:embed/>
                 </p:oleObj>
               </mc:Choice>
@@ -32061,7 +32645,7 @@
           <a:graphicData uri="http://schemas.openxmlformats.org/presentationml/2006/ole">
             <mc:AlternateContent xmlns:mc="http://schemas.openxmlformats.org/markup-compatibility/2006">
               <mc:Choice xmlns:v="urn:schemas-microsoft-com:vml" Requires="v">
-                <p:oleObj spid="_x0000_s8727" name="Bitmap Image" r:id="rId4" imgW="8534520" imgH="4819680" progId="Paint.Picture">
+                <p:oleObj spid="_x0000_s8741" name="Bitmap Image" r:id="rId4" imgW="8534520" imgH="4819680" progId="Paint.Picture">
                   <p:embed/>
                 </p:oleObj>
               </mc:Choice>
@@ -33399,24 +33983,6 @@
 </file>
 
 <file path=customXml/item1.xml><?xml version="1.0" encoding="utf-8"?>
-<?mso-contentType ?>
-<FormTemplates xmlns="http://schemas.microsoft.com/sharepoint/v3/contenttype/forms">
-  <Display>DocumentLibraryForm</Display>
-  <Edit>DocumentLibraryForm</Edit>
-  <New>DocumentLibraryForm</New>
-</FormTemplates>
-</file>
-
-<file path=customXml/item2.xml><?xml version="1.0" encoding="utf-8"?>
-<p:properties xmlns:p="http://schemas.microsoft.com/office/2006/metadata/properties" xmlns:xsi="http://www.w3.org/2001/XMLSchema-instance" xmlns:pc="http://schemas.microsoft.com/office/infopath/2007/PartnerControls">
-  <documentManagement>
-    <Status xmlns="71af3243-3dd4-4a8d-8c0d-dd76da1f02a5">Not started</Status>
-    <MediaServiceKeyPoints xmlns="71af3243-3dd4-4a8d-8c0d-dd76da1f02a5" xsi:nil="true"/>
-  </documentManagement>
-</p:properties>
-</file>
-
-<file path=customXml/item3.xml><?xml version="1.0" encoding="utf-8"?>
 <ct:contentTypeSchema xmlns:ct="http://schemas.microsoft.com/office/2006/metadata/contentType" xmlns:ma="http://schemas.microsoft.com/office/2006/metadata/properties/metaAttributes" ct:_="" ma:_="" ma:contentTypeName="Document" ma:contentTypeID="0x01010079F111ED35F8CC479449609E8A0923A6" ma:contentTypeVersion="12" ma:contentTypeDescription="Create a new document." ma:contentTypeScope="" ma:versionID="a8a52e8c320b9a064ae3583ae3861c92">
   <xsd:schema xmlns:xsd="http://www.w3.org/2001/XMLSchema" xmlns:xs="http://www.w3.org/2001/XMLSchema" xmlns:p="http://schemas.microsoft.com/office/2006/metadata/properties" xmlns:ns2="71af3243-3dd4-4a8d-8c0d-dd76da1f02a5" xmlns:ns3="16c05727-aa75-4e4a-9b5f-8a80a1165891" targetNamespace="http://schemas.microsoft.com/office/2006/metadata/properties" ma:root="true" ma:fieldsID="88020cb39231a0945110f9cd888b521a" ns2:_="" ns3:_="">
     <xsd:import namespace="71af3243-3dd4-4a8d-8c0d-dd76da1f02a5"/>
@@ -33637,32 +34203,25 @@
 </ct:contentTypeSchema>
 </file>
 
-<file path=customXml/itemProps1.xml><?xml version="1.0" encoding="utf-8"?>
-<ds:datastoreItem xmlns:ds="http://schemas.openxmlformats.org/officeDocument/2006/customXml" ds:itemID="{7EE8C63A-4744-4DE4-BB49-0FF0B5375C60}">
-  <ds:schemaRefs>
-    <ds:schemaRef ds:uri="http://schemas.microsoft.com/sharepoint/v3/contenttype/forms"/>
-  </ds:schemaRefs>
-</ds:datastoreItem>
+<file path=customXml/item2.xml><?xml version="1.0" encoding="utf-8"?>
+<?mso-contentType ?>
+<FormTemplates xmlns="http://schemas.microsoft.com/sharepoint/v3/contenttype/forms">
+  <Display>DocumentLibraryForm</Display>
+  <Edit>DocumentLibraryForm</Edit>
+  <New>DocumentLibraryForm</New>
+</FormTemplates>
 </file>
 
-<file path=customXml/itemProps2.xml><?xml version="1.0" encoding="utf-8"?>
-<ds:datastoreItem xmlns:ds="http://schemas.openxmlformats.org/officeDocument/2006/customXml" ds:itemID="{950072C5-DDE0-4258-BA7A-4D4B80DFA632}">
-  <ds:schemaRefs>
-    <ds:schemaRef ds:uri="http://schemas.openxmlformats.org/package/2006/metadata/core-properties"/>
-    <ds:schemaRef ds:uri="http://schemas.microsoft.com/office/2006/metadata/properties"/>
-    <ds:schemaRef ds:uri="http://purl.org/dc/terms/"/>
-    <ds:schemaRef ds:uri="http://www.w3.org/XML/1998/namespace"/>
-    <ds:schemaRef ds:uri="16c05727-aa75-4e4a-9b5f-8a80a1165891"/>
-    <ds:schemaRef ds:uri="http://purl.org/dc/dcmitype/"/>
-    <ds:schemaRef ds:uri="http://purl.org/dc/elements/1.1/"/>
-    <ds:schemaRef ds:uri="http://schemas.microsoft.com/office/2006/documentManagement/types"/>
-    <ds:schemaRef ds:uri="71af3243-3dd4-4a8d-8c0d-dd76da1f02a5"/>
-    <ds:schemaRef ds:uri="http://schemas.microsoft.com/office/infopath/2007/PartnerControls"/>
-  </ds:schemaRefs>
-</ds:datastoreItem>
+<file path=customXml/item3.xml><?xml version="1.0" encoding="utf-8"?>
+<p:properties xmlns:p="http://schemas.microsoft.com/office/2006/metadata/properties" xmlns:xsi="http://www.w3.org/2001/XMLSchema-instance" xmlns:pc="http://schemas.microsoft.com/office/infopath/2007/PartnerControls">
+  <documentManagement>
+    <Status xmlns="71af3243-3dd4-4a8d-8c0d-dd76da1f02a5">Not started</Status>
+    <MediaServiceKeyPoints xmlns="71af3243-3dd4-4a8d-8c0d-dd76da1f02a5" xsi:nil="true"/>
+  </documentManagement>
+</p:properties>
 </file>
 
-<file path=customXml/itemProps3.xml><?xml version="1.0" encoding="utf-8"?>
+<file path=customXml/itemProps1.xml><?xml version="1.0" encoding="utf-8"?>
 <ds:datastoreItem xmlns:ds="http://schemas.openxmlformats.org/officeDocument/2006/customXml" ds:itemID="{FD7FC771-7DFE-49DA-B577-71181BFBCB2E}">
   <ds:schemaRefs>
     <ds:schemaRef ds:uri="http://schemas.microsoft.com/office/2006/metadata/contentType"/>
@@ -33679,4 +34238,29 @@
     <ds:schemaRef ds:uri="http://schemas.microsoft.com/internal/obd"/>
   </ds:schemaRefs>
 </ds:datastoreItem>
+</file>
+
+<file path=customXml/itemProps2.xml><?xml version="1.0" encoding="utf-8"?>
+<ds:datastoreItem xmlns:ds="http://schemas.openxmlformats.org/officeDocument/2006/customXml" ds:itemID="{7EE8C63A-4744-4DE4-BB49-0FF0B5375C60}">
+  <ds:schemaRefs>
+    <ds:schemaRef ds:uri="http://schemas.microsoft.com/sharepoint/v3/contenttype/forms"/>
+  </ds:schemaRefs>
+</ds:datastoreItem>
+</file>
+
+<file path=customXml/itemProps3.xml><?xml version="1.0" encoding="utf-8"?>
+<ds:datastoreItem xmlns:ds="http://schemas.openxmlformats.org/officeDocument/2006/customXml" ds:itemID="{950072C5-DDE0-4258-BA7A-4D4B80DFA632}">
+  <ds:schemaRefs>
+    <ds:schemaRef ds:uri="http://purl.org/dc/terms/"/>
+    <ds:schemaRef ds:uri="http://purl.org/dc/dcmitype/"/>
+    <ds:schemaRef ds:uri="http://schemas.openxmlformats.org/package/2006/metadata/core-properties"/>
+    <ds:schemaRef ds:uri="16c05727-aa75-4e4a-9b5f-8a80a1165891"/>
+    <ds:schemaRef ds:uri="http://schemas.microsoft.com/office/2006/documentManagement/types"/>
+    <ds:schemaRef ds:uri="71af3243-3dd4-4a8d-8c0d-dd76da1f02a5"/>
+    <ds:schemaRef ds:uri="http://www.w3.org/XML/1998/namespace"/>
+    <ds:schemaRef ds:uri="http://schemas.microsoft.com/office/infopath/2007/PartnerControls"/>
+    <ds:schemaRef ds:uri="http://schemas.microsoft.com/office/2006/metadata/properties"/>
+    <ds:schemaRef ds:uri="http://purl.org/dc/elements/1.1/"/>
+  </ds:schemaRefs>
+</ds:datastoreItem>
 </file>
</xml_diff>

<commit_message>
centos 7 8 mở tab completion cho lệnh
</commit_message>
<xml_diff>
--- a/Ansible_LVM.pptx
+++ b/Ansible_LVM.pptx
@@ -8759,385 +8759,42 @@
               <a:defRPr/>
             </a:pPr>
             <a:r>
-              <a:rPr lang="en-US" b="0" err="1" smtClean="0">
+              <a:rPr lang="vi-VN" b="0" smtClean="0">
                 <a:solidFill>
                   <a:schemeClr val="tx1"/>
                 </a:solidFill>
                 <a:latin typeface="Times New Roman" panose="02020603050405020304" pitchFamily="18" charset="0"/>
                 <a:cs typeface="Times New Roman" panose="02020603050405020304" pitchFamily="18" charset="0"/>
               </a:rPr>
-              <a:t>Gỗ</a:t>
-            </a:r>
-            <a:r>
-              <a:rPr lang="en-US" b="0" baseline="0" smtClean="0">
+              <a:t>Để chạy được tabtab (</a:t>
+            </a:r>
+            <a:r>
+              <a:rPr lang="en-US" b="0" smtClean="0">
                 <a:solidFill>
                   <a:schemeClr val="tx1"/>
                 </a:solidFill>
                 <a:latin typeface="Times New Roman" panose="02020603050405020304" pitchFamily="18" charset="0"/>
                 <a:cs typeface="Times New Roman" panose="02020603050405020304" pitchFamily="18" charset="0"/>
               </a:rPr>
-              <a:t> </a:t>
-            </a:r>
-            <a:r>
-              <a:rPr lang="en-US" b="0" baseline="0" err="1" smtClean="0">
+              <a:t>tab completion</a:t>
+            </a:r>
+            <a:r>
+              <a:rPr lang="vi-VN" b="0" smtClean="0">
                 <a:solidFill>
                   <a:schemeClr val="tx1"/>
                 </a:solidFill>
                 <a:latin typeface="Times New Roman" panose="02020603050405020304" pitchFamily="18" charset="0"/>
                 <a:cs typeface="Times New Roman" panose="02020603050405020304" pitchFamily="18" charset="0"/>
               </a:rPr>
-              <a:t>pv</a:t>
-            </a:r>
-            <a:r>
-              <a:rPr lang="en-US" b="0" baseline="0" smtClean="0">
-                <a:solidFill>
-                  <a:schemeClr val="tx1"/>
-                </a:solidFill>
-                <a:latin typeface="Times New Roman" panose="02020603050405020304" pitchFamily="18" charset="0"/>
-                <a:cs typeface="Times New Roman" panose="02020603050405020304" pitchFamily="18" charset="0"/>
-              </a:rPr>
-              <a:t> </a:t>
-            </a:r>
-            <a:r>
-              <a:rPr lang="en-US" b="0" baseline="0" err="1" smtClean="0">
-                <a:solidFill>
-                  <a:schemeClr val="tx1"/>
-                </a:solidFill>
-                <a:latin typeface="Times New Roman" panose="02020603050405020304" pitchFamily="18" charset="0"/>
-                <a:cs typeface="Times New Roman" panose="02020603050405020304" pitchFamily="18" charset="0"/>
-              </a:rPr>
-              <a:t>và</a:t>
-            </a:r>
-            <a:r>
-              <a:rPr lang="en-US" b="0" baseline="0" smtClean="0">
-                <a:solidFill>
-                  <a:schemeClr val="tx1"/>
-                </a:solidFill>
-                <a:latin typeface="Times New Roman" panose="02020603050405020304" pitchFamily="18" charset="0"/>
-                <a:cs typeface="Times New Roman" panose="02020603050405020304" pitchFamily="18" charset="0"/>
-              </a:rPr>
-              <a:t> </a:t>
-            </a:r>
-            <a:r>
-              <a:rPr lang="en-US" b="0" baseline="0" err="1" smtClean="0">
-                <a:solidFill>
-                  <a:schemeClr val="tx1"/>
-                </a:solidFill>
-                <a:latin typeface="Times New Roman" panose="02020603050405020304" pitchFamily="18" charset="0"/>
-                <a:cs typeface="Times New Roman" panose="02020603050405020304" pitchFamily="18" charset="0"/>
-              </a:rPr>
-              <a:t>nhấn</a:t>
-            </a:r>
-            <a:r>
-              <a:rPr lang="en-US" b="0" baseline="0" smtClean="0">
-                <a:solidFill>
-                  <a:schemeClr val="tx1"/>
-                </a:solidFill>
-                <a:latin typeface="Times New Roman" panose="02020603050405020304" pitchFamily="18" charset="0"/>
-                <a:cs typeface="Times New Roman" panose="02020603050405020304" pitchFamily="18" charset="0"/>
-              </a:rPr>
-              <a:t> tab 2 </a:t>
-            </a:r>
-            <a:r>
-              <a:rPr lang="en-US" b="0" baseline="0" err="1" smtClean="0">
-                <a:solidFill>
-                  <a:schemeClr val="tx1"/>
-                </a:solidFill>
-                <a:latin typeface="Times New Roman" panose="02020603050405020304" pitchFamily="18" charset="0"/>
-                <a:cs typeface="Times New Roman" panose="02020603050405020304" pitchFamily="18" charset="0"/>
-              </a:rPr>
-              <a:t>lần</a:t>
-            </a:r>
-            <a:r>
-              <a:rPr lang="en-US" b="0" baseline="0" smtClean="0">
-                <a:solidFill>
-                  <a:schemeClr val="tx1"/>
-                </a:solidFill>
-                <a:latin typeface="Times New Roman" panose="02020603050405020304" pitchFamily="18" charset="0"/>
-                <a:cs typeface="Times New Roman" panose="02020603050405020304" pitchFamily="18" charset="0"/>
-              </a:rPr>
-              <a:t> </a:t>
-            </a:r>
-            <a:r>
-              <a:rPr lang="en-US" b="0" baseline="0" err="1" smtClean="0">
-                <a:solidFill>
-                  <a:schemeClr val="tx1"/>
-                </a:solidFill>
-                <a:latin typeface="Times New Roman" panose="02020603050405020304" pitchFamily="18" charset="0"/>
-                <a:cs typeface="Times New Roman" panose="02020603050405020304" pitchFamily="18" charset="0"/>
-              </a:rPr>
-              <a:t>liên</a:t>
-            </a:r>
-            <a:r>
-              <a:rPr lang="en-US" b="0" baseline="0" smtClean="0">
-                <a:solidFill>
-                  <a:schemeClr val="tx1"/>
-                </a:solidFill>
-                <a:latin typeface="Times New Roman" panose="02020603050405020304" pitchFamily="18" charset="0"/>
-                <a:cs typeface="Times New Roman" panose="02020603050405020304" pitchFamily="18" charset="0"/>
-              </a:rPr>
-              <a:t> </a:t>
-            </a:r>
-            <a:r>
-              <a:rPr lang="en-US" b="0" baseline="0" err="1" smtClean="0">
-                <a:solidFill>
-                  <a:schemeClr val="tx1"/>
-                </a:solidFill>
-                <a:latin typeface="Times New Roman" panose="02020603050405020304" pitchFamily="18" charset="0"/>
-                <a:cs typeface="Times New Roman" panose="02020603050405020304" pitchFamily="18" charset="0"/>
-              </a:rPr>
-              <a:t>tiếp</a:t>
-            </a:r>
-            <a:r>
-              <a:rPr lang="en-US" b="0" baseline="0" smtClean="0">
-                <a:solidFill>
-                  <a:schemeClr val="tx1"/>
-                </a:solidFill>
-                <a:latin typeface="Times New Roman" panose="02020603050405020304" pitchFamily="18" charset="0"/>
-                <a:cs typeface="Times New Roman" panose="02020603050405020304" pitchFamily="18" charset="0"/>
-              </a:rPr>
-              <a:t> </a:t>
-            </a:r>
-            <a:r>
-              <a:rPr lang="en-US" b="0" baseline="0" err="1" smtClean="0">
-                <a:solidFill>
-                  <a:schemeClr val="tx1"/>
-                </a:solidFill>
-                <a:latin typeface="Times New Roman" panose="02020603050405020304" pitchFamily="18" charset="0"/>
-                <a:cs typeface="Times New Roman" panose="02020603050405020304" pitchFamily="18" charset="0"/>
-              </a:rPr>
-              <a:t>để</a:t>
-            </a:r>
-            <a:r>
-              <a:rPr lang="en-US" b="0" baseline="0" smtClean="0">
-                <a:solidFill>
-                  <a:schemeClr val="tx1"/>
-                </a:solidFill>
-                <a:latin typeface="Times New Roman" panose="02020603050405020304" pitchFamily="18" charset="0"/>
-                <a:cs typeface="Times New Roman" panose="02020603050405020304" pitchFamily="18" charset="0"/>
-              </a:rPr>
-              <a:t> </a:t>
-            </a:r>
-            <a:r>
-              <a:rPr lang="en-US" b="0" baseline="0" err="1" smtClean="0">
-                <a:solidFill>
-                  <a:schemeClr val="tx1"/>
-                </a:solidFill>
-                <a:latin typeface="Times New Roman" panose="02020603050405020304" pitchFamily="18" charset="0"/>
-                <a:cs typeface="Times New Roman" panose="02020603050405020304" pitchFamily="18" charset="0"/>
-              </a:rPr>
-              <a:t>xem</a:t>
-            </a:r>
-            <a:r>
-              <a:rPr lang="en-US" b="0" baseline="0" smtClean="0">
-                <a:solidFill>
-                  <a:schemeClr val="tx1"/>
-                </a:solidFill>
-                <a:latin typeface="Times New Roman" panose="02020603050405020304" pitchFamily="18" charset="0"/>
-                <a:cs typeface="Times New Roman" panose="02020603050405020304" pitchFamily="18" charset="0"/>
-              </a:rPr>
-              <a:t> </a:t>
-            </a:r>
-            <a:r>
-              <a:rPr lang="en-US" b="0" baseline="0" err="1" smtClean="0">
-                <a:solidFill>
-                  <a:schemeClr val="tx1"/>
-                </a:solidFill>
-                <a:latin typeface="Times New Roman" panose="02020603050405020304" pitchFamily="18" charset="0"/>
-                <a:cs typeface="Times New Roman" panose="02020603050405020304" pitchFamily="18" charset="0"/>
-              </a:rPr>
-              <a:t>tất</a:t>
-            </a:r>
-            <a:r>
-              <a:rPr lang="en-US" b="0" baseline="0" smtClean="0">
-                <a:solidFill>
-                  <a:schemeClr val="tx1"/>
-                </a:solidFill>
-                <a:latin typeface="Times New Roman" panose="02020603050405020304" pitchFamily="18" charset="0"/>
-                <a:cs typeface="Times New Roman" panose="02020603050405020304" pitchFamily="18" charset="0"/>
-              </a:rPr>
-              <a:t> </a:t>
-            </a:r>
-            <a:r>
-              <a:rPr lang="en-US" b="0" baseline="0" err="1" smtClean="0">
-                <a:solidFill>
-                  <a:schemeClr val="tx1"/>
-                </a:solidFill>
-                <a:latin typeface="Times New Roman" panose="02020603050405020304" pitchFamily="18" charset="0"/>
-                <a:cs typeface="Times New Roman" panose="02020603050405020304" pitchFamily="18" charset="0"/>
-              </a:rPr>
-              <a:t>cả</a:t>
-            </a:r>
-            <a:r>
-              <a:rPr lang="en-US" b="0" baseline="0" smtClean="0">
-                <a:solidFill>
-                  <a:schemeClr val="tx1"/>
-                </a:solidFill>
-                <a:latin typeface="Times New Roman" panose="02020603050405020304" pitchFamily="18" charset="0"/>
-                <a:cs typeface="Times New Roman" panose="02020603050405020304" pitchFamily="18" charset="0"/>
-              </a:rPr>
-              <a:t> </a:t>
-            </a:r>
-            <a:r>
-              <a:rPr lang="en-US" b="0" baseline="0" err="1" smtClean="0">
-                <a:solidFill>
-                  <a:schemeClr val="tx1"/>
-                </a:solidFill>
-                <a:latin typeface="Times New Roman" panose="02020603050405020304" pitchFamily="18" charset="0"/>
-                <a:cs typeface="Times New Roman" panose="02020603050405020304" pitchFamily="18" charset="0"/>
-              </a:rPr>
-              <a:t>các</a:t>
-            </a:r>
-            <a:r>
-              <a:rPr lang="en-US" b="0" baseline="0" smtClean="0">
-                <a:solidFill>
-                  <a:schemeClr val="tx1"/>
-                </a:solidFill>
-                <a:latin typeface="Times New Roman" panose="02020603050405020304" pitchFamily="18" charset="0"/>
-                <a:cs typeface="Times New Roman" panose="02020603050405020304" pitchFamily="18" charset="0"/>
-              </a:rPr>
-              <a:t> </a:t>
-            </a:r>
-            <a:r>
-              <a:rPr lang="en-US" b="0" baseline="0" err="1" smtClean="0">
-                <a:solidFill>
-                  <a:schemeClr val="tx1"/>
-                </a:solidFill>
-                <a:latin typeface="Times New Roman" panose="02020603050405020304" pitchFamily="18" charset="0"/>
-                <a:cs typeface="Times New Roman" panose="02020603050405020304" pitchFamily="18" charset="0"/>
-              </a:rPr>
-              <a:t>lệnh</a:t>
-            </a:r>
-            <a:r>
-              <a:rPr lang="en-US" b="0" baseline="0" smtClean="0">
-                <a:solidFill>
-                  <a:schemeClr val="tx1"/>
-                </a:solidFill>
-                <a:latin typeface="Times New Roman" panose="02020603050405020304" pitchFamily="18" charset="0"/>
-                <a:cs typeface="Times New Roman" panose="02020603050405020304" pitchFamily="18" charset="0"/>
-              </a:rPr>
-              <a:t> </a:t>
-            </a:r>
-            <a:r>
-              <a:rPr lang="en-US" b="0" baseline="0" err="1" smtClean="0">
-                <a:solidFill>
-                  <a:schemeClr val="tx1"/>
-                </a:solidFill>
-                <a:latin typeface="Times New Roman" panose="02020603050405020304" pitchFamily="18" charset="0"/>
-                <a:cs typeface="Times New Roman" panose="02020603050405020304" pitchFamily="18" charset="0"/>
-              </a:rPr>
-              <a:t>bắt</a:t>
-            </a:r>
-            <a:r>
-              <a:rPr lang="en-US" b="0" baseline="0" smtClean="0">
-                <a:solidFill>
-                  <a:schemeClr val="tx1"/>
-                </a:solidFill>
-                <a:latin typeface="Times New Roman" panose="02020603050405020304" pitchFamily="18" charset="0"/>
-                <a:cs typeface="Times New Roman" panose="02020603050405020304" pitchFamily="18" charset="0"/>
-              </a:rPr>
-              <a:t> </a:t>
-            </a:r>
-            <a:r>
-              <a:rPr lang="en-US" b="0" baseline="0" err="1" smtClean="0">
-                <a:solidFill>
-                  <a:schemeClr val="tx1"/>
-                </a:solidFill>
-                <a:latin typeface="Times New Roman" panose="02020603050405020304" pitchFamily="18" charset="0"/>
-                <a:cs typeface="Times New Roman" panose="02020603050405020304" pitchFamily="18" charset="0"/>
-              </a:rPr>
-              <a:t>đầu</a:t>
-            </a:r>
-            <a:r>
-              <a:rPr lang="en-US" b="0" baseline="0" smtClean="0">
-                <a:solidFill>
-                  <a:schemeClr val="tx1"/>
-                </a:solidFill>
-                <a:latin typeface="Times New Roman" panose="02020603050405020304" pitchFamily="18" charset="0"/>
-                <a:cs typeface="Times New Roman" panose="02020603050405020304" pitchFamily="18" charset="0"/>
-              </a:rPr>
-              <a:t> </a:t>
-            </a:r>
-            <a:r>
-              <a:rPr lang="en-US" b="0" baseline="0" err="1" smtClean="0">
-                <a:solidFill>
-                  <a:schemeClr val="tx1"/>
-                </a:solidFill>
-                <a:latin typeface="Times New Roman" panose="02020603050405020304" pitchFamily="18" charset="0"/>
-                <a:cs typeface="Times New Roman" panose="02020603050405020304" pitchFamily="18" charset="0"/>
-              </a:rPr>
-              <a:t>bằng</a:t>
-            </a:r>
-            <a:r>
-              <a:rPr lang="en-US" b="0" baseline="0" smtClean="0">
-                <a:solidFill>
-                  <a:schemeClr val="tx1"/>
-                </a:solidFill>
-                <a:latin typeface="Times New Roman" panose="02020603050405020304" pitchFamily="18" charset="0"/>
-                <a:cs typeface="Times New Roman" panose="02020603050405020304" pitchFamily="18" charset="0"/>
-              </a:rPr>
-              <a:t> </a:t>
-            </a:r>
-            <a:r>
-              <a:rPr lang="en-US" b="0" baseline="0" err="1" smtClean="0">
-                <a:solidFill>
-                  <a:schemeClr val="tx1"/>
-                </a:solidFill>
-                <a:latin typeface="Times New Roman" panose="02020603050405020304" pitchFamily="18" charset="0"/>
-                <a:cs typeface="Times New Roman" panose="02020603050405020304" pitchFamily="18" charset="0"/>
-              </a:rPr>
-              <a:t>pv</a:t>
-            </a:r>
-            <a:r>
-              <a:rPr lang="en-US" b="0" baseline="0" smtClean="0">
-                <a:solidFill>
-                  <a:schemeClr val="tx1"/>
-                </a:solidFill>
-                <a:latin typeface="Times New Roman" panose="02020603050405020304" pitchFamily="18" charset="0"/>
-                <a:cs typeface="Times New Roman" panose="02020603050405020304" pitchFamily="18" charset="0"/>
-              </a:rPr>
-              <a:t> </a:t>
-            </a:r>
-            <a:r>
-              <a:rPr lang="en-US" b="0" baseline="0" err="1" smtClean="0">
-                <a:solidFill>
-                  <a:schemeClr val="tx1"/>
-                </a:solidFill>
-                <a:latin typeface="Times New Roman" panose="02020603050405020304" pitchFamily="18" charset="0"/>
-                <a:cs typeface="Times New Roman" panose="02020603050405020304" pitchFamily="18" charset="0"/>
-              </a:rPr>
-              <a:t>có</a:t>
-            </a:r>
-            <a:r>
-              <a:rPr lang="en-US" b="0" baseline="0" smtClean="0">
-                <a:solidFill>
-                  <a:schemeClr val="tx1"/>
-                </a:solidFill>
-                <a:latin typeface="Times New Roman" panose="02020603050405020304" pitchFamily="18" charset="0"/>
-                <a:cs typeface="Times New Roman" panose="02020603050405020304" pitchFamily="18" charset="0"/>
-              </a:rPr>
-              <a:t> </a:t>
-            </a:r>
-            <a:r>
-              <a:rPr lang="en-US" b="0" baseline="0" err="1" smtClean="0">
-                <a:solidFill>
-                  <a:schemeClr val="tx1"/>
-                </a:solidFill>
-                <a:latin typeface="Times New Roman" panose="02020603050405020304" pitchFamily="18" charset="0"/>
-                <a:cs typeface="Times New Roman" panose="02020603050405020304" pitchFamily="18" charset="0"/>
-              </a:rPr>
-              <a:t>trên</a:t>
-            </a:r>
-            <a:r>
-              <a:rPr lang="en-US" b="0" baseline="0" smtClean="0">
-                <a:solidFill>
-                  <a:schemeClr val="tx1"/>
-                </a:solidFill>
-                <a:latin typeface="Times New Roman" panose="02020603050405020304" pitchFamily="18" charset="0"/>
-                <a:cs typeface="Times New Roman" panose="02020603050405020304" pitchFamily="18" charset="0"/>
-              </a:rPr>
-              <a:t> OS</a:t>
-            </a:r>
+              <a:t>) gợi ý và tự động điền lệnh thì làm như sau</a:t>
+            </a:r>
+            <a:endParaRPr lang="en-US" b="0" smtClean="0">
+              <a:solidFill>
+                <a:schemeClr val="tx1"/>
+              </a:solidFill>
+              <a:latin typeface="Times New Roman" panose="02020603050405020304" pitchFamily="18" charset="0"/>
+              <a:cs typeface="Times New Roman" panose="02020603050405020304" pitchFamily="18" charset="0"/>
+            </a:endParaRPr>
           </a:p>
           <a:p>
             <a:pPr marL="0" marR="0" indent="0" algn="l" defTabSz="914400" rtl="0" eaLnBrk="1" fontAlgn="auto" latinLnBrk="0" hangingPunct="1">
@@ -9157,13 +8814,503 @@
               <a:tabLst/>
               <a:defRPr/>
             </a:pPr>
-            <a:endParaRPr lang="en-US" b="0" baseline="0" smtClean="0">
+            <a:endParaRPr lang="vi-VN" b="0" smtClean="0">
               <a:solidFill>
                 <a:schemeClr val="tx1"/>
               </a:solidFill>
               <a:latin typeface="Times New Roman" panose="02020603050405020304" pitchFamily="18" charset="0"/>
               <a:cs typeface="Times New Roman" panose="02020603050405020304" pitchFamily="18" charset="0"/>
             </a:endParaRPr>
+          </a:p>
+          <a:p>
+            <a:pPr marL="0" marR="0" indent="0" algn="l" defTabSz="914400" rtl="0" eaLnBrk="1" fontAlgn="auto" latinLnBrk="0" hangingPunct="1">
+              <a:lnSpc>
+                <a:spcPct val="100000"/>
+              </a:lnSpc>
+              <a:spcBef>
+                <a:spcPts val="0"/>
+              </a:spcBef>
+              <a:spcAft>
+                <a:spcPts val="0"/>
+              </a:spcAft>
+              <a:buClrTx/>
+              <a:buSzTx/>
+              <a:buFontTx/>
+              <a:buNone/>
+              <a:tabLst/>
+              <a:defRPr/>
+            </a:pPr>
+            <a:r>
+              <a:rPr lang="vi-VN" b="0" smtClean="0">
+                <a:solidFill>
+                  <a:schemeClr val="tx1"/>
+                </a:solidFill>
+                <a:latin typeface="Times New Roman" panose="02020603050405020304" pitchFamily="18" charset="0"/>
+                <a:cs typeface="Times New Roman" panose="02020603050405020304" pitchFamily="18" charset="0"/>
+              </a:rPr>
+              <a:t>yum install bash-completion -y &amp;&amp; \</a:t>
+            </a:r>
+          </a:p>
+          <a:p>
+            <a:pPr marL="0" marR="0" indent="0" algn="l" defTabSz="914400" rtl="0" eaLnBrk="1" fontAlgn="auto" latinLnBrk="0" hangingPunct="1">
+              <a:lnSpc>
+                <a:spcPct val="100000"/>
+              </a:lnSpc>
+              <a:spcBef>
+                <a:spcPts val="0"/>
+              </a:spcBef>
+              <a:spcAft>
+                <a:spcPts val="0"/>
+              </a:spcAft>
+              <a:buClrTx/>
+              <a:buSzTx/>
+              <a:buFontTx/>
+              <a:buNone/>
+              <a:tabLst/>
+              <a:defRPr/>
+            </a:pPr>
+            <a:r>
+              <a:rPr lang="vi-VN" b="0" smtClean="0">
+                <a:solidFill>
+                  <a:schemeClr val="tx1"/>
+                </a:solidFill>
+                <a:latin typeface="Times New Roman" panose="02020603050405020304" pitchFamily="18" charset="0"/>
+                <a:cs typeface="Times New Roman" panose="02020603050405020304" pitchFamily="18" charset="0"/>
+              </a:rPr>
+              <a:t>source /etc/profile.d/bash_completion.sh</a:t>
+            </a:r>
+            <a:endParaRPr lang="en-US" b="0" smtClean="0">
+              <a:solidFill>
+                <a:schemeClr val="tx1"/>
+              </a:solidFill>
+              <a:latin typeface="Times New Roman" panose="02020603050405020304" pitchFamily="18" charset="0"/>
+              <a:cs typeface="Times New Roman" panose="02020603050405020304" pitchFamily="18" charset="0"/>
+            </a:endParaRPr>
+          </a:p>
+          <a:p>
+            <a:pPr marL="0" marR="0" indent="0" algn="l" defTabSz="914400" rtl="0" eaLnBrk="1" fontAlgn="auto" latinLnBrk="0" hangingPunct="1">
+              <a:lnSpc>
+                <a:spcPct val="100000"/>
+              </a:lnSpc>
+              <a:spcBef>
+                <a:spcPts val="0"/>
+              </a:spcBef>
+              <a:spcAft>
+                <a:spcPts val="0"/>
+              </a:spcAft>
+              <a:buClrTx/>
+              <a:buSzTx/>
+              <a:buFontTx/>
+              <a:buNone/>
+              <a:tabLst/>
+              <a:defRPr/>
+            </a:pPr>
+            <a:endParaRPr lang="en-US" b="0" smtClean="0">
+              <a:solidFill>
+                <a:schemeClr val="tx1"/>
+              </a:solidFill>
+              <a:latin typeface="Times New Roman" panose="02020603050405020304" pitchFamily="18" charset="0"/>
+              <a:cs typeface="Times New Roman" panose="02020603050405020304" pitchFamily="18" charset="0"/>
+            </a:endParaRPr>
+          </a:p>
+          <a:p>
+            <a:pPr marL="0" marR="0" indent="0" algn="l" defTabSz="914400" rtl="0" eaLnBrk="1" fontAlgn="auto" latinLnBrk="0" hangingPunct="1">
+              <a:lnSpc>
+                <a:spcPct val="100000"/>
+              </a:lnSpc>
+              <a:spcBef>
+                <a:spcPts val="0"/>
+              </a:spcBef>
+              <a:spcAft>
+                <a:spcPts val="0"/>
+              </a:spcAft>
+              <a:buClrTx/>
+              <a:buSzTx/>
+              <a:buFontTx/>
+              <a:buNone/>
+              <a:tabLst/>
+              <a:defRPr/>
+            </a:pPr>
+            <a:r>
+              <a:rPr lang="en-US" b="0" smtClean="0">
+                <a:solidFill>
+                  <a:schemeClr val="tx1"/>
+                </a:solidFill>
+                <a:latin typeface="Times New Roman" panose="02020603050405020304" pitchFamily="18" charset="0"/>
+                <a:cs typeface="Times New Roman" panose="02020603050405020304" pitchFamily="18" charset="0"/>
+              </a:rPr>
+              <a:t>Gõ</a:t>
+            </a:r>
+            <a:r>
+              <a:rPr lang="en-US" b="0" baseline="0" smtClean="0">
+                <a:solidFill>
+                  <a:schemeClr val="tx1"/>
+                </a:solidFill>
+                <a:latin typeface="Times New Roman" panose="02020603050405020304" pitchFamily="18" charset="0"/>
+                <a:cs typeface="Times New Roman" panose="02020603050405020304" pitchFamily="18" charset="0"/>
+              </a:rPr>
+              <a:t> </a:t>
+            </a:r>
+            <a:r>
+              <a:rPr lang="en-US" b="0" baseline="0" err="1" smtClean="0">
+                <a:solidFill>
+                  <a:schemeClr val="tx1"/>
+                </a:solidFill>
+                <a:latin typeface="Times New Roman" panose="02020603050405020304" pitchFamily="18" charset="0"/>
+                <a:cs typeface="Times New Roman" panose="02020603050405020304" pitchFamily="18" charset="0"/>
+              </a:rPr>
+              <a:t>pv</a:t>
+            </a:r>
+            <a:r>
+              <a:rPr lang="en-US" b="0" baseline="0" smtClean="0">
+                <a:solidFill>
+                  <a:schemeClr val="tx1"/>
+                </a:solidFill>
+                <a:latin typeface="Times New Roman" panose="02020603050405020304" pitchFamily="18" charset="0"/>
+                <a:cs typeface="Times New Roman" panose="02020603050405020304" pitchFamily="18" charset="0"/>
+              </a:rPr>
+              <a:t> </a:t>
+            </a:r>
+            <a:r>
+              <a:rPr lang="en-US" b="0" baseline="0" err="1" smtClean="0">
+                <a:solidFill>
+                  <a:schemeClr val="tx1"/>
+                </a:solidFill>
+                <a:latin typeface="Times New Roman" panose="02020603050405020304" pitchFamily="18" charset="0"/>
+                <a:cs typeface="Times New Roman" panose="02020603050405020304" pitchFamily="18" charset="0"/>
+              </a:rPr>
+              <a:t>và</a:t>
+            </a:r>
+            <a:r>
+              <a:rPr lang="en-US" b="0" baseline="0" smtClean="0">
+                <a:solidFill>
+                  <a:schemeClr val="tx1"/>
+                </a:solidFill>
+                <a:latin typeface="Times New Roman" panose="02020603050405020304" pitchFamily="18" charset="0"/>
+                <a:cs typeface="Times New Roman" panose="02020603050405020304" pitchFamily="18" charset="0"/>
+              </a:rPr>
+              <a:t> </a:t>
+            </a:r>
+            <a:r>
+              <a:rPr lang="en-US" b="0" baseline="0" err="1" smtClean="0">
+                <a:solidFill>
+                  <a:schemeClr val="tx1"/>
+                </a:solidFill>
+                <a:latin typeface="Times New Roman" panose="02020603050405020304" pitchFamily="18" charset="0"/>
+                <a:cs typeface="Times New Roman" panose="02020603050405020304" pitchFamily="18" charset="0"/>
+              </a:rPr>
+              <a:t>nhấn</a:t>
+            </a:r>
+            <a:r>
+              <a:rPr lang="en-US" b="0" baseline="0" smtClean="0">
+                <a:solidFill>
+                  <a:schemeClr val="tx1"/>
+                </a:solidFill>
+                <a:latin typeface="Times New Roman" panose="02020603050405020304" pitchFamily="18" charset="0"/>
+                <a:cs typeface="Times New Roman" panose="02020603050405020304" pitchFamily="18" charset="0"/>
+              </a:rPr>
+              <a:t> tab 2 </a:t>
+            </a:r>
+            <a:r>
+              <a:rPr lang="en-US" b="0" baseline="0" err="1" smtClean="0">
+                <a:solidFill>
+                  <a:schemeClr val="tx1"/>
+                </a:solidFill>
+                <a:latin typeface="Times New Roman" panose="02020603050405020304" pitchFamily="18" charset="0"/>
+                <a:cs typeface="Times New Roman" panose="02020603050405020304" pitchFamily="18" charset="0"/>
+              </a:rPr>
+              <a:t>lần</a:t>
+            </a:r>
+            <a:r>
+              <a:rPr lang="en-US" b="0" baseline="0" smtClean="0">
+                <a:solidFill>
+                  <a:schemeClr val="tx1"/>
+                </a:solidFill>
+                <a:latin typeface="Times New Roman" panose="02020603050405020304" pitchFamily="18" charset="0"/>
+                <a:cs typeface="Times New Roman" panose="02020603050405020304" pitchFamily="18" charset="0"/>
+              </a:rPr>
+              <a:t> </a:t>
+            </a:r>
+            <a:r>
+              <a:rPr lang="en-US" b="0" baseline="0" err="1" smtClean="0">
+                <a:solidFill>
+                  <a:schemeClr val="tx1"/>
+                </a:solidFill>
+                <a:latin typeface="Times New Roman" panose="02020603050405020304" pitchFamily="18" charset="0"/>
+                <a:cs typeface="Times New Roman" panose="02020603050405020304" pitchFamily="18" charset="0"/>
+              </a:rPr>
+              <a:t>liên</a:t>
+            </a:r>
+            <a:r>
+              <a:rPr lang="en-US" b="0" baseline="0" smtClean="0">
+                <a:solidFill>
+                  <a:schemeClr val="tx1"/>
+                </a:solidFill>
+                <a:latin typeface="Times New Roman" panose="02020603050405020304" pitchFamily="18" charset="0"/>
+                <a:cs typeface="Times New Roman" panose="02020603050405020304" pitchFamily="18" charset="0"/>
+              </a:rPr>
+              <a:t> </a:t>
+            </a:r>
+            <a:r>
+              <a:rPr lang="en-US" b="0" baseline="0" err="1" smtClean="0">
+                <a:solidFill>
+                  <a:schemeClr val="tx1"/>
+                </a:solidFill>
+                <a:latin typeface="Times New Roman" panose="02020603050405020304" pitchFamily="18" charset="0"/>
+                <a:cs typeface="Times New Roman" panose="02020603050405020304" pitchFamily="18" charset="0"/>
+              </a:rPr>
+              <a:t>tiếp</a:t>
+            </a:r>
+            <a:r>
+              <a:rPr lang="en-US" b="0" baseline="0" smtClean="0">
+                <a:solidFill>
+                  <a:schemeClr val="tx1"/>
+                </a:solidFill>
+                <a:latin typeface="Times New Roman" panose="02020603050405020304" pitchFamily="18" charset="0"/>
+                <a:cs typeface="Times New Roman" panose="02020603050405020304" pitchFamily="18" charset="0"/>
+              </a:rPr>
+              <a:t> </a:t>
+            </a:r>
+            <a:r>
+              <a:rPr lang="en-US" b="0" baseline="0" err="1" smtClean="0">
+                <a:solidFill>
+                  <a:schemeClr val="tx1"/>
+                </a:solidFill>
+                <a:latin typeface="Times New Roman" panose="02020603050405020304" pitchFamily="18" charset="0"/>
+                <a:cs typeface="Times New Roman" panose="02020603050405020304" pitchFamily="18" charset="0"/>
+              </a:rPr>
+              <a:t>để</a:t>
+            </a:r>
+            <a:r>
+              <a:rPr lang="en-US" b="0" baseline="0" smtClean="0">
+                <a:solidFill>
+                  <a:schemeClr val="tx1"/>
+                </a:solidFill>
+                <a:latin typeface="Times New Roman" panose="02020603050405020304" pitchFamily="18" charset="0"/>
+                <a:cs typeface="Times New Roman" panose="02020603050405020304" pitchFamily="18" charset="0"/>
+              </a:rPr>
+              <a:t> </a:t>
+            </a:r>
+            <a:r>
+              <a:rPr lang="en-US" b="0" baseline="0" err="1" smtClean="0">
+                <a:solidFill>
+                  <a:schemeClr val="tx1"/>
+                </a:solidFill>
+                <a:latin typeface="Times New Roman" panose="02020603050405020304" pitchFamily="18" charset="0"/>
+                <a:cs typeface="Times New Roman" panose="02020603050405020304" pitchFamily="18" charset="0"/>
+              </a:rPr>
+              <a:t>xem</a:t>
+            </a:r>
+            <a:r>
+              <a:rPr lang="en-US" b="0" baseline="0" smtClean="0">
+                <a:solidFill>
+                  <a:schemeClr val="tx1"/>
+                </a:solidFill>
+                <a:latin typeface="Times New Roman" panose="02020603050405020304" pitchFamily="18" charset="0"/>
+                <a:cs typeface="Times New Roman" panose="02020603050405020304" pitchFamily="18" charset="0"/>
+              </a:rPr>
+              <a:t> </a:t>
+            </a:r>
+            <a:r>
+              <a:rPr lang="en-US" b="0" baseline="0" err="1" smtClean="0">
+                <a:solidFill>
+                  <a:schemeClr val="tx1"/>
+                </a:solidFill>
+                <a:latin typeface="Times New Roman" panose="02020603050405020304" pitchFamily="18" charset="0"/>
+                <a:cs typeface="Times New Roman" panose="02020603050405020304" pitchFamily="18" charset="0"/>
+              </a:rPr>
+              <a:t>tất</a:t>
+            </a:r>
+            <a:r>
+              <a:rPr lang="en-US" b="0" baseline="0" smtClean="0">
+                <a:solidFill>
+                  <a:schemeClr val="tx1"/>
+                </a:solidFill>
+                <a:latin typeface="Times New Roman" panose="02020603050405020304" pitchFamily="18" charset="0"/>
+                <a:cs typeface="Times New Roman" panose="02020603050405020304" pitchFamily="18" charset="0"/>
+              </a:rPr>
+              <a:t> </a:t>
+            </a:r>
+            <a:r>
+              <a:rPr lang="en-US" b="0" baseline="0" err="1" smtClean="0">
+                <a:solidFill>
+                  <a:schemeClr val="tx1"/>
+                </a:solidFill>
+                <a:latin typeface="Times New Roman" panose="02020603050405020304" pitchFamily="18" charset="0"/>
+                <a:cs typeface="Times New Roman" panose="02020603050405020304" pitchFamily="18" charset="0"/>
+              </a:rPr>
+              <a:t>cả</a:t>
+            </a:r>
+            <a:r>
+              <a:rPr lang="en-US" b="0" baseline="0" smtClean="0">
+                <a:solidFill>
+                  <a:schemeClr val="tx1"/>
+                </a:solidFill>
+                <a:latin typeface="Times New Roman" panose="02020603050405020304" pitchFamily="18" charset="0"/>
+                <a:cs typeface="Times New Roman" panose="02020603050405020304" pitchFamily="18" charset="0"/>
+              </a:rPr>
+              <a:t> </a:t>
+            </a:r>
+            <a:r>
+              <a:rPr lang="en-US" b="0" baseline="0" err="1" smtClean="0">
+                <a:solidFill>
+                  <a:schemeClr val="tx1"/>
+                </a:solidFill>
+                <a:latin typeface="Times New Roman" panose="02020603050405020304" pitchFamily="18" charset="0"/>
+                <a:cs typeface="Times New Roman" panose="02020603050405020304" pitchFamily="18" charset="0"/>
+              </a:rPr>
+              <a:t>các</a:t>
+            </a:r>
+            <a:r>
+              <a:rPr lang="en-US" b="0" baseline="0" smtClean="0">
+                <a:solidFill>
+                  <a:schemeClr val="tx1"/>
+                </a:solidFill>
+                <a:latin typeface="Times New Roman" panose="02020603050405020304" pitchFamily="18" charset="0"/>
+                <a:cs typeface="Times New Roman" panose="02020603050405020304" pitchFamily="18" charset="0"/>
+              </a:rPr>
+              <a:t> </a:t>
+            </a:r>
+            <a:r>
+              <a:rPr lang="en-US" b="0" baseline="0" err="1" smtClean="0">
+                <a:solidFill>
+                  <a:schemeClr val="tx1"/>
+                </a:solidFill>
+                <a:latin typeface="Times New Roman" panose="02020603050405020304" pitchFamily="18" charset="0"/>
+                <a:cs typeface="Times New Roman" panose="02020603050405020304" pitchFamily="18" charset="0"/>
+              </a:rPr>
+              <a:t>lệnh</a:t>
+            </a:r>
+            <a:r>
+              <a:rPr lang="en-US" b="0" baseline="0" smtClean="0">
+                <a:solidFill>
+                  <a:schemeClr val="tx1"/>
+                </a:solidFill>
+                <a:latin typeface="Times New Roman" panose="02020603050405020304" pitchFamily="18" charset="0"/>
+                <a:cs typeface="Times New Roman" panose="02020603050405020304" pitchFamily="18" charset="0"/>
+              </a:rPr>
+              <a:t> </a:t>
+            </a:r>
+            <a:r>
+              <a:rPr lang="en-US" b="0" baseline="0" err="1" smtClean="0">
+                <a:solidFill>
+                  <a:schemeClr val="tx1"/>
+                </a:solidFill>
+                <a:latin typeface="Times New Roman" panose="02020603050405020304" pitchFamily="18" charset="0"/>
+                <a:cs typeface="Times New Roman" panose="02020603050405020304" pitchFamily="18" charset="0"/>
+              </a:rPr>
+              <a:t>bắt</a:t>
+            </a:r>
+            <a:r>
+              <a:rPr lang="en-US" b="0" baseline="0" smtClean="0">
+                <a:solidFill>
+                  <a:schemeClr val="tx1"/>
+                </a:solidFill>
+                <a:latin typeface="Times New Roman" panose="02020603050405020304" pitchFamily="18" charset="0"/>
+                <a:cs typeface="Times New Roman" panose="02020603050405020304" pitchFamily="18" charset="0"/>
+              </a:rPr>
+              <a:t> </a:t>
+            </a:r>
+            <a:r>
+              <a:rPr lang="en-US" b="0" baseline="0" err="1" smtClean="0">
+                <a:solidFill>
+                  <a:schemeClr val="tx1"/>
+                </a:solidFill>
+                <a:latin typeface="Times New Roman" panose="02020603050405020304" pitchFamily="18" charset="0"/>
+                <a:cs typeface="Times New Roman" panose="02020603050405020304" pitchFamily="18" charset="0"/>
+              </a:rPr>
+              <a:t>đầu</a:t>
+            </a:r>
+            <a:r>
+              <a:rPr lang="en-US" b="0" baseline="0" smtClean="0">
+                <a:solidFill>
+                  <a:schemeClr val="tx1"/>
+                </a:solidFill>
+                <a:latin typeface="Times New Roman" panose="02020603050405020304" pitchFamily="18" charset="0"/>
+                <a:cs typeface="Times New Roman" panose="02020603050405020304" pitchFamily="18" charset="0"/>
+              </a:rPr>
+              <a:t> </a:t>
+            </a:r>
+            <a:r>
+              <a:rPr lang="en-US" b="0" baseline="0" err="1" smtClean="0">
+                <a:solidFill>
+                  <a:schemeClr val="tx1"/>
+                </a:solidFill>
+                <a:latin typeface="Times New Roman" panose="02020603050405020304" pitchFamily="18" charset="0"/>
+                <a:cs typeface="Times New Roman" panose="02020603050405020304" pitchFamily="18" charset="0"/>
+              </a:rPr>
+              <a:t>bằng</a:t>
+            </a:r>
+            <a:r>
+              <a:rPr lang="en-US" b="0" baseline="0" smtClean="0">
+                <a:solidFill>
+                  <a:schemeClr val="tx1"/>
+                </a:solidFill>
+                <a:latin typeface="Times New Roman" panose="02020603050405020304" pitchFamily="18" charset="0"/>
+                <a:cs typeface="Times New Roman" panose="02020603050405020304" pitchFamily="18" charset="0"/>
+              </a:rPr>
+              <a:t> </a:t>
+            </a:r>
+            <a:r>
+              <a:rPr lang="en-US" b="0" baseline="0" err="1" smtClean="0">
+                <a:solidFill>
+                  <a:schemeClr val="tx1"/>
+                </a:solidFill>
+                <a:latin typeface="Times New Roman" panose="02020603050405020304" pitchFamily="18" charset="0"/>
+                <a:cs typeface="Times New Roman" panose="02020603050405020304" pitchFamily="18" charset="0"/>
+              </a:rPr>
+              <a:t>pv</a:t>
+            </a:r>
+            <a:r>
+              <a:rPr lang="en-US" b="0" baseline="0" smtClean="0">
+                <a:solidFill>
+                  <a:schemeClr val="tx1"/>
+                </a:solidFill>
+                <a:latin typeface="Times New Roman" panose="02020603050405020304" pitchFamily="18" charset="0"/>
+                <a:cs typeface="Times New Roman" panose="02020603050405020304" pitchFamily="18" charset="0"/>
+              </a:rPr>
+              <a:t> </a:t>
+            </a:r>
+            <a:r>
+              <a:rPr lang="en-US" b="0" baseline="0" err="1" smtClean="0">
+                <a:solidFill>
+                  <a:schemeClr val="tx1"/>
+                </a:solidFill>
+                <a:latin typeface="Times New Roman" panose="02020603050405020304" pitchFamily="18" charset="0"/>
+                <a:cs typeface="Times New Roman" panose="02020603050405020304" pitchFamily="18" charset="0"/>
+              </a:rPr>
+              <a:t>có</a:t>
+            </a:r>
+            <a:r>
+              <a:rPr lang="en-US" b="0" baseline="0" smtClean="0">
+                <a:solidFill>
+                  <a:schemeClr val="tx1"/>
+                </a:solidFill>
+                <a:latin typeface="Times New Roman" panose="02020603050405020304" pitchFamily="18" charset="0"/>
+                <a:cs typeface="Times New Roman" panose="02020603050405020304" pitchFamily="18" charset="0"/>
+              </a:rPr>
+              <a:t> </a:t>
+            </a:r>
+            <a:r>
+              <a:rPr lang="en-US" b="0" baseline="0" err="1" smtClean="0">
+                <a:solidFill>
+                  <a:schemeClr val="tx1"/>
+                </a:solidFill>
+                <a:latin typeface="Times New Roman" panose="02020603050405020304" pitchFamily="18" charset="0"/>
+                <a:cs typeface="Times New Roman" panose="02020603050405020304" pitchFamily="18" charset="0"/>
+              </a:rPr>
+              <a:t>trên</a:t>
+            </a:r>
+            <a:r>
+              <a:rPr lang="en-US" b="0" baseline="0" smtClean="0">
+                <a:solidFill>
+                  <a:schemeClr val="tx1"/>
+                </a:solidFill>
+                <a:latin typeface="Times New Roman" panose="02020603050405020304" pitchFamily="18" charset="0"/>
+                <a:cs typeface="Times New Roman" panose="02020603050405020304" pitchFamily="18" charset="0"/>
+              </a:rPr>
+              <a:t> OS</a:t>
+            </a:r>
           </a:p>
           <a:p>
             <a:pPr marL="0" marR="0" indent="0" algn="l" defTabSz="914400" rtl="0" eaLnBrk="1" fontAlgn="auto" latinLnBrk="0" hangingPunct="1">
@@ -11949,15 +12096,7 @@
                   <a:schemeClr val="bg1"/>
                 </a:solidFill>
               </a:rPr>
-              <a:t>Thay đổi mới </a:t>
-            </a:r>
-            <a:r>
-              <a:rPr lang="en-US" sz="3000" smtClean="0">
-                <a:solidFill>
-                  <a:schemeClr val="bg1"/>
-                </a:solidFill>
-              </a:rPr>
-              <a:t>nhất: 13/08/2021</a:t>
+              <a:t>Thay đổi mới nhất: 13/08/2021</a:t>
             </a:r>
             <a:r>
               <a:rPr lang="en-US" sz="4000" smtClean="0">
@@ -31862,7 +32001,7 @@
           <a:graphicData uri="http://schemas.openxmlformats.org/presentationml/2006/ole">
             <mc:AlternateContent xmlns:mc="http://schemas.openxmlformats.org/markup-compatibility/2006">
               <mc:Choice xmlns:v="urn:schemas-microsoft-com:vml" Requires="v">
-                <p:oleObj spid="_x0000_s10536" name="Bitmap Image" r:id="rId4" imgW="8534520" imgH="4819680" progId="Paint.Picture">
+                <p:oleObj spid="_x0000_s10540" name="Bitmap Image" r:id="rId4" imgW="8534520" imgH="4819680" progId="Paint.Picture">
                   <p:embed/>
                 </p:oleObj>
               </mc:Choice>
@@ -32645,7 +32784,7 @@
           <a:graphicData uri="http://schemas.openxmlformats.org/presentationml/2006/ole">
             <mc:AlternateContent xmlns:mc="http://schemas.openxmlformats.org/markup-compatibility/2006">
               <mc:Choice xmlns:v="urn:schemas-microsoft-com:vml" Requires="v">
-                <p:oleObj spid="_x0000_s8741" name="Bitmap Image" r:id="rId4" imgW="8534520" imgH="4819680" progId="Paint.Picture">
+                <p:oleObj spid="_x0000_s8745" name="Bitmap Image" r:id="rId4" imgW="8534520" imgH="4819680" progId="Paint.Picture">
                   <p:embed/>
                 </p:oleObj>
               </mc:Choice>
@@ -33983,6 +34122,24 @@
 </file>
 
 <file path=customXml/item1.xml><?xml version="1.0" encoding="utf-8"?>
+<?mso-contentType ?>
+<FormTemplates xmlns="http://schemas.microsoft.com/sharepoint/v3/contenttype/forms">
+  <Display>DocumentLibraryForm</Display>
+  <Edit>DocumentLibraryForm</Edit>
+  <New>DocumentLibraryForm</New>
+</FormTemplates>
+</file>
+
+<file path=customXml/item2.xml><?xml version="1.0" encoding="utf-8"?>
+<p:properties xmlns:p="http://schemas.microsoft.com/office/2006/metadata/properties" xmlns:xsi="http://www.w3.org/2001/XMLSchema-instance" xmlns:pc="http://schemas.microsoft.com/office/infopath/2007/PartnerControls">
+  <documentManagement>
+    <Status xmlns="71af3243-3dd4-4a8d-8c0d-dd76da1f02a5">Not started</Status>
+    <MediaServiceKeyPoints xmlns="71af3243-3dd4-4a8d-8c0d-dd76da1f02a5" xsi:nil="true"/>
+  </documentManagement>
+</p:properties>
+</file>
+
+<file path=customXml/item3.xml><?xml version="1.0" encoding="utf-8"?>
 <ct:contentTypeSchema xmlns:ct="http://schemas.microsoft.com/office/2006/metadata/contentType" xmlns:ma="http://schemas.microsoft.com/office/2006/metadata/properties/metaAttributes" ct:_="" ma:_="" ma:contentTypeName="Document" ma:contentTypeID="0x01010079F111ED35F8CC479449609E8A0923A6" ma:contentTypeVersion="12" ma:contentTypeDescription="Create a new document." ma:contentTypeScope="" ma:versionID="a8a52e8c320b9a064ae3583ae3861c92">
   <xsd:schema xmlns:xsd="http://www.w3.org/2001/XMLSchema" xmlns:xs="http://www.w3.org/2001/XMLSchema" xmlns:p="http://schemas.microsoft.com/office/2006/metadata/properties" xmlns:ns2="71af3243-3dd4-4a8d-8c0d-dd76da1f02a5" xmlns:ns3="16c05727-aa75-4e4a-9b5f-8a80a1165891" targetNamespace="http://schemas.microsoft.com/office/2006/metadata/properties" ma:root="true" ma:fieldsID="88020cb39231a0945110f9cd888b521a" ns2:_="" ns3:_="">
     <xsd:import namespace="71af3243-3dd4-4a8d-8c0d-dd76da1f02a5"/>
@@ -34203,25 +34360,32 @@
 </ct:contentTypeSchema>
 </file>
 
-<file path=customXml/item2.xml><?xml version="1.0" encoding="utf-8"?>
-<?mso-contentType ?>
-<FormTemplates xmlns="http://schemas.microsoft.com/sharepoint/v3/contenttype/forms">
-  <Display>DocumentLibraryForm</Display>
-  <Edit>DocumentLibraryForm</Edit>
-  <New>DocumentLibraryForm</New>
-</FormTemplates>
+<file path=customXml/itemProps1.xml><?xml version="1.0" encoding="utf-8"?>
+<ds:datastoreItem xmlns:ds="http://schemas.openxmlformats.org/officeDocument/2006/customXml" ds:itemID="{7EE8C63A-4744-4DE4-BB49-0FF0B5375C60}">
+  <ds:schemaRefs>
+    <ds:schemaRef ds:uri="http://schemas.microsoft.com/sharepoint/v3/contenttype/forms"/>
+  </ds:schemaRefs>
+</ds:datastoreItem>
 </file>
 
-<file path=customXml/item3.xml><?xml version="1.0" encoding="utf-8"?>
-<p:properties xmlns:p="http://schemas.microsoft.com/office/2006/metadata/properties" xmlns:xsi="http://www.w3.org/2001/XMLSchema-instance" xmlns:pc="http://schemas.microsoft.com/office/infopath/2007/PartnerControls">
-  <documentManagement>
-    <Status xmlns="71af3243-3dd4-4a8d-8c0d-dd76da1f02a5">Not started</Status>
-    <MediaServiceKeyPoints xmlns="71af3243-3dd4-4a8d-8c0d-dd76da1f02a5" xsi:nil="true"/>
-  </documentManagement>
-</p:properties>
+<file path=customXml/itemProps2.xml><?xml version="1.0" encoding="utf-8"?>
+<ds:datastoreItem xmlns:ds="http://schemas.openxmlformats.org/officeDocument/2006/customXml" ds:itemID="{950072C5-DDE0-4258-BA7A-4D4B80DFA632}">
+  <ds:schemaRefs>
+    <ds:schemaRef ds:uri="http://purl.org/dc/terms/"/>
+    <ds:schemaRef ds:uri="http://purl.org/dc/dcmitype/"/>
+    <ds:schemaRef ds:uri="http://schemas.openxmlformats.org/package/2006/metadata/core-properties"/>
+    <ds:schemaRef ds:uri="16c05727-aa75-4e4a-9b5f-8a80a1165891"/>
+    <ds:schemaRef ds:uri="http://schemas.microsoft.com/office/2006/documentManagement/types"/>
+    <ds:schemaRef ds:uri="71af3243-3dd4-4a8d-8c0d-dd76da1f02a5"/>
+    <ds:schemaRef ds:uri="http://www.w3.org/XML/1998/namespace"/>
+    <ds:schemaRef ds:uri="http://schemas.microsoft.com/office/infopath/2007/PartnerControls"/>
+    <ds:schemaRef ds:uri="http://schemas.microsoft.com/office/2006/metadata/properties"/>
+    <ds:schemaRef ds:uri="http://purl.org/dc/elements/1.1/"/>
+  </ds:schemaRefs>
+</ds:datastoreItem>
 </file>
 
-<file path=customXml/itemProps1.xml><?xml version="1.0" encoding="utf-8"?>
+<file path=customXml/itemProps3.xml><?xml version="1.0" encoding="utf-8"?>
 <ds:datastoreItem xmlns:ds="http://schemas.openxmlformats.org/officeDocument/2006/customXml" ds:itemID="{FD7FC771-7DFE-49DA-B577-71181BFBCB2E}">
   <ds:schemaRefs>
     <ds:schemaRef ds:uri="http://schemas.microsoft.com/office/2006/metadata/contentType"/>
@@ -34238,29 +34402,4 @@
     <ds:schemaRef ds:uri="http://schemas.microsoft.com/internal/obd"/>
   </ds:schemaRefs>
 </ds:datastoreItem>
-</file>
-
-<file path=customXml/itemProps2.xml><?xml version="1.0" encoding="utf-8"?>
-<ds:datastoreItem xmlns:ds="http://schemas.openxmlformats.org/officeDocument/2006/customXml" ds:itemID="{7EE8C63A-4744-4DE4-BB49-0FF0B5375C60}">
-  <ds:schemaRefs>
-    <ds:schemaRef ds:uri="http://schemas.microsoft.com/sharepoint/v3/contenttype/forms"/>
-  </ds:schemaRefs>
-</ds:datastoreItem>
-</file>
-
-<file path=customXml/itemProps3.xml><?xml version="1.0" encoding="utf-8"?>
-<ds:datastoreItem xmlns:ds="http://schemas.openxmlformats.org/officeDocument/2006/customXml" ds:itemID="{950072C5-DDE0-4258-BA7A-4D4B80DFA632}">
-  <ds:schemaRefs>
-    <ds:schemaRef ds:uri="http://purl.org/dc/terms/"/>
-    <ds:schemaRef ds:uri="http://purl.org/dc/dcmitype/"/>
-    <ds:schemaRef ds:uri="http://schemas.openxmlformats.org/package/2006/metadata/core-properties"/>
-    <ds:schemaRef ds:uri="16c05727-aa75-4e4a-9b5f-8a80a1165891"/>
-    <ds:schemaRef ds:uri="http://schemas.microsoft.com/office/2006/documentManagement/types"/>
-    <ds:schemaRef ds:uri="71af3243-3dd4-4a8d-8c0d-dd76da1f02a5"/>
-    <ds:schemaRef ds:uri="http://www.w3.org/XML/1998/namespace"/>
-    <ds:schemaRef ds:uri="http://schemas.microsoft.com/office/infopath/2007/PartnerControls"/>
-    <ds:schemaRef ds:uri="http://schemas.microsoft.com/office/2006/metadata/properties"/>
-    <ds:schemaRef ds:uri="http://purl.org/dc/elements/1.1/"/>
-  </ds:schemaRefs>
-</ds:datastoreItem>
 </file>
</xml_diff>